<commit_message>
Revisited MMSYN tutorial 1
</commit_message>
<xml_diff>
--- a/doc/documentation/documentation.pptx
+++ b/doc/documentation/documentation.pptx
@@ -4108,9 +4108,9 @@
         <p:grpSpPr>
           <a:xfrm>
             <a:off x="4990174" y="760340"/>
-            <a:ext cx="1533654" cy="584775"/>
+            <a:ext cx="1622846" cy="584775"/>
             <a:chOff x="2701544" y="1851593"/>
-            <a:chExt cx="1533654" cy="584775"/>
+            <a:chExt cx="1622846" cy="584775"/>
           </a:xfrm>
         </p:grpSpPr>
         <p:pic>
@@ -4173,7 +4173,7 @@
           <p:spPr>
             <a:xfrm>
               <a:off x="3100657" y="1851593"/>
-              <a:ext cx="1134541" cy="584775"/>
+              <a:ext cx="1223733" cy="584775"/>
             </a:xfrm>
             <a:prstGeom prst="rect">
               <a:avLst/>
@@ -4188,7 +4188,7 @@
             <a:p>
               <a:r>
                 <a:rPr lang="fr-FR" b="1"/>
-                <a:t>Step 1:</a:t>
+                <a:t>Tutorial 1:</a:t>
               </a:r>
             </a:p>
             <a:p>
@@ -4333,7 +4333,7 @@
             <a:p>
               <a:r>
                 <a:rPr lang="fr-FR" b="1"/>
-                <a:t>Step 2:</a:t>
+                <a:t>Tutorial 2:</a:t>
               </a:r>
             </a:p>
             <a:p>
@@ -4484,7 +4484,7 @@
             <a:p>
               <a:r>
                 <a:rPr lang="fr-FR" b="1"/>
-                <a:t>Step 3:</a:t>
+                <a:t>Tutorial 3:</a:t>
               </a:r>
             </a:p>
             <a:p>
@@ -4592,7 +4592,7 @@
             <a:p>
               <a:r>
                 <a:rPr lang="fr-FR" b="1"/>
-                <a:t>Step 4:</a:t>
+                <a:t>Tutorial 4:</a:t>
               </a:r>
             </a:p>
             <a:p>
@@ -4705,7 +4705,7 @@
             <a:p>
               <a:r>
                 <a:rPr lang="fr-FR" b="1"/>
-                <a:t>Step 5:</a:t>
+                <a:t>Tutorial 5:</a:t>
               </a:r>
             </a:p>
             <a:p>
@@ -4954,7 +4954,7 @@
             <a:p>
               <a:r>
                 <a:rPr lang="fr-FR" b="1"/>
-                <a:t>Step 6:</a:t>
+                <a:t>Tutorial 6:</a:t>
               </a:r>
             </a:p>
             <a:p>
@@ -5112,7 +5112,7 @@
             <a:p>
               <a:r>
                 <a:rPr lang="fr-FR" b="1"/>
-                <a:t>Step 7:</a:t>
+                <a:t>Tutorial 7:</a:t>
               </a:r>
             </a:p>
             <a:p>
@@ -5225,7 +5225,7 @@
             <a:p>
               <a:r>
                 <a:rPr lang="fr-FR" b="1"/>
-                <a:t>Step 8:</a:t>
+                <a:t>Tutorial 8:</a:t>
               </a:r>
             </a:p>
             <a:p>

</xml_diff>